<commit_message>
Feedback on project presentation ('Notes'), minor edits to powerpoint
</commit_message>
<xml_diff>
--- a/Project_Presentation.pptx
+++ b/Project_Presentation.pptx
@@ -13517,6 +13517,40 @@
               <a:buChar char="v"/>
             </a:pPr>
             <a:r>
+              <a:rPr lang="en-US" dirty="0"/>
+              <a:t>No </a:t>
+            </a:r>
+            <a:r>
+              <a:rPr lang="en-US" dirty="0" err="1"/>
+              <a:t>dummification</a:t>
+            </a:r>
+            <a:r>
+              <a:rPr lang="en-US" dirty="0"/>
+              <a:t> required </a:t>
+            </a:r>
+          </a:p>
+          <a:p>
+            <a:pPr>
+              <a:buFont typeface="Wingdings" panose="05000000000000000000" pitchFamily="2" charset="2"/>
+              <a:buChar char="v"/>
+            </a:pPr>
+            <a:r>
+              <a:rPr lang="en-US" dirty="0"/>
+              <a:t>Feature Importance </a:t>
+            </a:r>
+            <a:r>
+              <a:rPr lang="en-US" dirty="0">
+                <a:sym typeface="Wingdings" panose="05000000000000000000" pitchFamily="2" charset="2"/>
+              </a:rPr>
+              <a:t></a:t>
+            </a:r>
+          </a:p>
+          <a:p>
+            <a:pPr>
+              <a:buFont typeface="Wingdings" panose="05000000000000000000" pitchFamily="2" charset="2"/>
+              <a:buChar char="v"/>
+            </a:pPr>
+            <a:r>
               <a:rPr lang="en-US" dirty="0">
                 <a:sym typeface="Wingdings" panose="05000000000000000000" pitchFamily="2" charset="2"/>
               </a:rPr>
@@ -13534,41 +13568,6 @@
               </a:rPr>
               <a:t>/cv tuning metric</a:t>
             </a:r>
-            <a:endParaRPr lang="en-US" dirty="0"/>
-          </a:p>
-          <a:p>
-            <a:pPr>
-              <a:buFont typeface="Wingdings" panose="05000000000000000000" pitchFamily="2" charset="2"/>
-              <a:buChar char="v"/>
-            </a:pPr>
-            <a:r>
-              <a:rPr lang="en-US" dirty="0"/>
-              <a:t>No </a:t>
-            </a:r>
-            <a:r>
-              <a:rPr lang="en-US" dirty="0" err="1"/>
-              <a:t>dummification</a:t>
-            </a:r>
-            <a:r>
-              <a:rPr lang="en-US" dirty="0"/>
-              <a:t> required </a:t>
-            </a:r>
-          </a:p>
-          <a:p>
-            <a:pPr>
-              <a:buFont typeface="Wingdings" panose="05000000000000000000" pitchFamily="2" charset="2"/>
-              <a:buChar char="v"/>
-            </a:pPr>
-            <a:r>
-              <a:rPr lang="en-US" dirty="0"/>
-              <a:t>Feature Importance </a:t>
-            </a:r>
-            <a:r>
-              <a:rPr lang="en-US" dirty="0">
-                <a:sym typeface="Wingdings" panose="05000000000000000000" pitchFamily="2" charset="2"/>
-              </a:rPr>
-              <a:t></a:t>
-            </a:r>
           </a:p>
           <a:p>
             <a:pPr>
@@ -13579,7 +13578,7 @@
               <a:rPr lang="en-US" dirty="0">
                 <a:sym typeface="Wingdings" panose="05000000000000000000" pitchFamily="2" charset="2"/>
               </a:rPr>
-              <a:t>Marginal improvement in CV results, but vastly improved how robust the models were when testing on new data</a:t>
+              <a:t>Marginal improvement in CV results, but vastly improved how robust the models were when submitting on Kaggle</a:t>
             </a:r>
           </a:p>
         </p:txBody>
@@ -13706,7 +13705,7 @@
           <a:p>
             <a:r>
               <a:rPr lang="en-US" dirty="0"/>
-              <a:t>Stacking Ensemble in theory builds on the different strengths of different models. Its poorer performance suggests to me that the base models may use similar information to predict values</a:t>
+              <a:t>Stacking Ensemble in theory builds on the different strengths of different models. Its poorer performance suggests to me that the base models may use similar information to predict values.</a:t>
             </a:r>
           </a:p>
         </p:txBody>
@@ -16619,7 +16618,7 @@
             </a:pPr>
             <a:r>
               <a:rPr lang="en-US" dirty="0"/>
-              <a:t> RMSE is used to evaluate submissions, using the log of predicted and actual values</a:t>
+              <a:t> RMSLE is used to evaluate submissions, using the log of predicted and actual target values</a:t>
             </a:r>
           </a:p>
           <a:p>
@@ -17180,13 +17179,33 @@
           <a:lstStyle/>
           <a:p>
             <a:r>
-              <a:rPr lang="en-US">
+              <a:rPr lang="en-US" dirty="0">
+                <a:solidFill>
+                  <a:schemeClr val="bg1"/>
+                </a:solidFill>
+              </a:rPr>
+              <a:t>Iterative</a:t>
+            </a:r>
+            <a:br>
+              <a:rPr lang="en-US" dirty="0">
+                <a:solidFill>
+                  <a:schemeClr val="bg1"/>
+                </a:solidFill>
+              </a:rPr>
+            </a:br>
+            <a:r>
+              <a:rPr lang="en-US" dirty="0" err="1">
                 <a:solidFill>
                   <a:schemeClr val="bg1"/>
                 </a:solidFill>
               </a:rPr>
               <a:t>pROCESS</a:t>
             </a:r>
+            <a:endParaRPr lang="en-US" dirty="0">
+              <a:solidFill>
+                <a:schemeClr val="bg1"/>
+              </a:solidFill>
+            </a:endParaRPr>
           </a:p>
         </p:txBody>
       </p:sp>
@@ -17333,7 +17352,7 @@
             </a:pPr>
             <a:r>
               <a:rPr lang="en-US" dirty="0"/>
-              <a:t> Explore relationships between features and the target variable</a:t>
+              <a:t> Look at relationships between features and the target variable</a:t>
             </a:r>
           </a:p>
           <a:p>
@@ -17385,7 +17404,7 @@
             </a:pPr>
             <a:r>
               <a:rPr lang="en-US" dirty="0"/>
-              <a:t>Explore the shape of the data</a:t>
+              <a:t> Explore the shape of the data</a:t>
             </a:r>
           </a:p>
         </p:txBody>
@@ -17956,14 +17975,14 @@
           <a:lstStyle/>
           <a:p>
             <a:r>
-              <a:rPr lang="en-US"/>
+              <a:rPr lang="en-US" dirty="0"/>
               <a:t>Categorical variables were tougher to explore in mass, but made up about half the dataset</a:t>
             </a:r>
           </a:p>
           <a:p>
             <a:r>
-              <a:rPr lang="en-US"/>
-              <a:t>Above are two categorical features with the strongest relationship with sale price (as determined by later feature importance exploration in the intermediary models)</a:t>
+              <a:rPr lang="en-US" dirty="0"/>
+              <a:t>These are two categorical features with the strongest relationship with sale price (as determined by later feature importance exploration in the intermediary models)</a:t>
             </a:r>
           </a:p>
         </p:txBody>

</xml_diff>